<commit_message>
updated chapter captions in graphics
</commit_message>
<xml_diff>
--- a/_defense_presentation.pptx
+++ b/_defense_presentation.pptx
@@ -2610,21 +2610,7 @@
                 <a:ea typeface="+mn-ea"/>
                 <a:cs typeface="+mn-cs"/>
               </a:rPr>
-              <a:t> / </a:t>
-            </a:r>
-            <a:r>
-              <a:rPr lang="de-DE" sz="1050" b="0" kern="1200" dirty="0" smtClean="0">
-                <a:solidFill>
-                  <a:schemeClr val="tx2">
-                    <a:lumMod val="20000"/>
-                    <a:lumOff val="80000"/>
-                  </a:schemeClr>
-                </a:solidFill>
-                <a:latin typeface="+mn-lt"/>
-                <a:ea typeface="+mn-ea"/>
-                <a:cs typeface="+mn-cs"/>
-              </a:rPr>
-              <a:t>10</a:t>
+              <a:t> / 10</a:t>
             </a:r>
             <a:endParaRPr lang="de-DE" sz="1050" b="0" kern="1200" dirty="0">
               <a:solidFill>
@@ -10119,7 +10105,7 @@
       </p:grpSpPr>
       <p:pic>
         <p:nvPicPr>
-          <p:cNvPr id="27" name="Grafik 26"/>
+          <p:cNvPr id="4" name="Grafik 3"/>
           <p:cNvPicPr>
             <a:picLocks noChangeAspect="1"/>
           </p:cNvPicPr>
@@ -10140,16 +10126,104 @@
         <p:spPr>
           <a:xfrm>
             <a:off x="321455" y="2438397"/>
-            <a:ext cx="10478174" cy="3132139"/>
+            <a:ext cx="10478172" cy="3132139"/>
           </a:xfrm>
           <a:prstGeom prst="rect">
             <a:avLst/>
           </a:prstGeom>
         </p:spPr>
       </p:pic>
+      <p:sp>
+        <p:nvSpPr>
+          <p:cNvPr id="2" name="Titel 1"/>
+          <p:cNvSpPr>
+            <a:spLocks noGrp="1"/>
+          </p:cNvSpPr>
+          <p:nvPr>
+            <p:ph type="title"/>
+          </p:nvPr>
+        </p:nvSpPr>
+        <p:spPr/>
+        <p:txBody>
+          <a:bodyPr/>
+          <a:lstStyle/>
+          <a:p>
+            <a:r>
+              <a:rPr lang="de-DE" dirty="0" err="1" smtClean="0"/>
+              <a:t>Representation</a:t>
+            </a:r>
+            <a:r>
+              <a:rPr lang="de-DE" dirty="0" smtClean="0"/>
+              <a:t> in </a:t>
+            </a:r>
+            <a:r>
+              <a:rPr lang="de-DE" dirty="0" err="1" smtClean="0"/>
+              <a:t>thesis</a:t>
+            </a:r>
+            <a:endParaRPr lang="de-DE" dirty="0"/>
+          </a:p>
+        </p:txBody>
+      </p:sp>
+      <p:sp>
+        <p:nvSpPr>
+          <p:cNvPr id="5" name="Footer Placeholder 4"/>
+          <p:cNvSpPr>
+            <a:spLocks noGrp="1"/>
+          </p:cNvSpPr>
+          <p:nvPr>
+            <p:ph type="ftr" sz="quarter" idx="11"/>
+          </p:nvPr>
+        </p:nvSpPr>
+        <p:spPr>
+          <a:xfrm rot="16200000">
+            <a:off x="9959341" y="4046537"/>
+            <a:ext cx="3581400" cy="365125"/>
+          </a:xfrm>
+        </p:spPr>
+        <p:txBody>
+          <a:bodyPr/>
+          <a:lstStyle/>
+          <a:p>
+            <a:endParaRPr lang="de-DE" dirty="0"/>
+          </a:p>
+        </p:txBody>
+      </p:sp>
+      <p:sp>
+        <p:nvSpPr>
+          <p:cNvPr id="6" name="Date Placeholder 3"/>
+          <p:cNvSpPr>
+            <a:spLocks noGrp="1"/>
+          </p:cNvSpPr>
+          <p:nvPr>
+            <p:ph type="dt" sz="half" idx="10"/>
+          </p:nvPr>
+        </p:nvSpPr>
+        <p:spPr>
+          <a:xfrm>
+            <a:off x="11292396" y="635"/>
+            <a:ext cx="899604" cy="365125"/>
+          </a:xfrm>
+        </p:spPr>
+        <p:txBody>
+          <a:bodyPr/>
+          <a:lstStyle>
+            <a:lvl1pPr>
+              <a:defRPr/>
+            </a:lvl1pPr>
+          </a:lstStyle>
+          <a:p>
+            <a:pPr algn="ctr"/>
+            <a:r>
+              <a:rPr lang="de-DE" dirty="0" smtClean="0"/>
+              <a:t>2019-09-16</a:t>
+            </a:r>
+            <a:endParaRPr lang="de-DE" dirty="0"/>
+          </a:p>
+        </p:txBody>
+      </p:sp>
       <p:pic>
         <p:nvPicPr>
-          <p:cNvPr id="29" name="Grafik 28"/>
+          <p:cNvPr id="7" name="Grafik 6"/>
           <p:cNvPicPr>
             <a:picLocks noChangeAspect="1"/>
           </p:cNvPicPr>
@@ -10169,105 +10243,17 @@
         </p:blipFill>
         <p:spPr>
           <a:xfrm>
-            <a:off x="321453" y="2438396"/>
-            <a:ext cx="10478182" cy="3132140"/>
+            <a:off x="321455" y="2438397"/>
+            <a:ext cx="10478172" cy="3132139"/>
           </a:xfrm>
           <a:prstGeom prst="rect">
             <a:avLst/>
           </a:prstGeom>
         </p:spPr>
       </p:pic>
-      <p:sp>
-        <p:nvSpPr>
-          <p:cNvPr id="2" name="Titel 1"/>
-          <p:cNvSpPr>
-            <a:spLocks noGrp="1"/>
-          </p:cNvSpPr>
-          <p:nvPr>
-            <p:ph type="title"/>
-          </p:nvPr>
-        </p:nvSpPr>
-        <p:spPr/>
-        <p:txBody>
-          <a:bodyPr/>
-          <a:lstStyle/>
-          <a:p>
-            <a:r>
-              <a:rPr lang="de-DE" dirty="0" err="1" smtClean="0"/>
-              <a:t>Representation</a:t>
-            </a:r>
-            <a:r>
-              <a:rPr lang="de-DE" dirty="0" smtClean="0"/>
-              <a:t> in </a:t>
-            </a:r>
-            <a:r>
-              <a:rPr lang="de-DE" dirty="0" err="1" smtClean="0"/>
-              <a:t>thesis</a:t>
-            </a:r>
-            <a:endParaRPr lang="de-DE" dirty="0"/>
-          </a:p>
-        </p:txBody>
-      </p:sp>
-      <p:sp>
-        <p:nvSpPr>
-          <p:cNvPr id="5" name="Footer Placeholder 4"/>
-          <p:cNvSpPr>
-            <a:spLocks noGrp="1"/>
-          </p:cNvSpPr>
-          <p:nvPr>
-            <p:ph type="ftr" sz="quarter" idx="11"/>
-          </p:nvPr>
-        </p:nvSpPr>
-        <p:spPr>
-          <a:xfrm rot="16200000">
-            <a:off x="9959341" y="4046537"/>
-            <a:ext cx="3581400" cy="365125"/>
-          </a:xfrm>
-        </p:spPr>
-        <p:txBody>
-          <a:bodyPr/>
-          <a:lstStyle/>
-          <a:p>
-            <a:endParaRPr lang="de-DE" dirty="0"/>
-          </a:p>
-        </p:txBody>
-      </p:sp>
-      <p:sp>
-        <p:nvSpPr>
-          <p:cNvPr id="6" name="Date Placeholder 3"/>
-          <p:cNvSpPr>
-            <a:spLocks noGrp="1"/>
-          </p:cNvSpPr>
-          <p:nvPr>
-            <p:ph type="dt" sz="half" idx="10"/>
-          </p:nvPr>
-        </p:nvSpPr>
-        <p:spPr>
-          <a:xfrm>
-            <a:off x="11292396" y="635"/>
-            <a:ext cx="899604" cy="365125"/>
-          </a:xfrm>
-        </p:spPr>
-        <p:txBody>
-          <a:bodyPr/>
-          <a:lstStyle>
-            <a:lvl1pPr>
-              <a:defRPr/>
-            </a:lvl1pPr>
-          </a:lstStyle>
-          <a:p>
-            <a:pPr algn="ctr"/>
-            <a:r>
-              <a:rPr lang="de-DE" dirty="0" smtClean="0"/>
-              <a:t>2019-09-16</a:t>
-            </a:r>
-            <a:endParaRPr lang="de-DE" dirty="0"/>
-          </a:p>
-        </p:txBody>
-      </p:sp>
       <p:pic>
         <p:nvPicPr>
-          <p:cNvPr id="32" name="Grafik 31"/>
+          <p:cNvPr id="8" name="Grafik 7"/>
           <p:cNvPicPr>
             <a:picLocks noChangeAspect="1"/>
           </p:cNvPicPr>
@@ -10287,8 +10273,8 @@
         </p:blipFill>
         <p:spPr>
           <a:xfrm>
-            <a:off x="321447" y="2438394"/>
-            <a:ext cx="10478180" cy="3132139"/>
+            <a:off x="321455" y="2438396"/>
+            <a:ext cx="10478172" cy="3132139"/>
           </a:xfrm>
           <a:prstGeom prst="rect">
             <a:avLst/>
@@ -10297,7 +10283,7 @@
       </p:pic>
       <p:pic>
         <p:nvPicPr>
-          <p:cNvPr id="31" name="Grafik 30"/>
+          <p:cNvPr id="10" name="Grafik 9"/>
           <p:cNvPicPr>
             <a:picLocks noChangeAspect="1"/>
           </p:cNvPicPr>
@@ -10317,8 +10303,8 @@
         </p:blipFill>
         <p:spPr>
           <a:xfrm>
-            <a:off x="321455" y="2438394"/>
-            <a:ext cx="10478172" cy="3132139"/>
+            <a:off x="321455" y="2438395"/>
+            <a:ext cx="10478172" cy="3125068"/>
           </a:xfrm>
           <a:prstGeom prst="rect">
             <a:avLst/>
@@ -10347,9 +10333,6 @@
                     <p:cTn id="3" fill="hold">
                       <p:stCondLst>
                         <p:cond delay="indefinite"/>
-                        <p:cond evt="onBegin" delay="0">
-                          <p:tn val="2"/>
-                        </p:cond>
                       </p:stCondLst>
                       <p:childTnLst>
                         <p:par>
@@ -10359,7 +10342,7 @@
                             </p:stCondLst>
                             <p:childTnLst>
                               <p:par>
-                                <p:cTn id="5" presetID="1" presetClass="entr" presetSubtype="0" fill="hold" nodeType="withEffect">
+                                <p:cTn id="5" presetID="10" presetClass="entr" presetSubtype="0" fill="hold" nodeType="clickEffect">
                                   <p:stCondLst>
                                     <p:cond delay="0"/>
                                   </p:stCondLst>
@@ -10372,52 +10355,7 @@
                                           </p:stCondLst>
                                         </p:cTn>
                                         <p:tgtEl>
-                                          <p:spTgt spid="27"/>
-                                        </p:tgtEl>
-                                        <p:attrNameLst>
-                                          <p:attrName>style.visibility</p:attrName>
-                                        </p:attrNameLst>
-                                      </p:cBhvr>
-                                      <p:to>
-                                        <p:strVal val="visible"/>
-                                      </p:to>
-                                    </p:set>
-                                  </p:childTnLst>
-                                </p:cTn>
-                              </p:par>
-                            </p:childTnLst>
-                          </p:cTn>
-                        </p:par>
-                      </p:childTnLst>
-                    </p:cTn>
-                  </p:par>
-                  <p:par>
-                    <p:cTn id="7" fill="hold">
-                      <p:stCondLst>
-                        <p:cond delay="indefinite"/>
-                      </p:stCondLst>
-                      <p:childTnLst>
-                        <p:par>
-                          <p:cTn id="8" fill="hold">
-                            <p:stCondLst>
-                              <p:cond delay="0"/>
-                            </p:stCondLst>
-                            <p:childTnLst>
-                              <p:par>
-                                <p:cTn id="9" presetID="10" presetClass="entr" presetSubtype="0" fill="hold" nodeType="clickEffect">
-                                  <p:stCondLst>
-                                    <p:cond delay="0"/>
-                                  </p:stCondLst>
-                                  <p:childTnLst>
-                                    <p:set>
-                                      <p:cBhvr>
-                                        <p:cTn id="10" dur="1" fill="hold">
-                                          <p:stCondLst>
-                                            <p:cond delay="0"/>
-                                          </p:stCondLst>
-                                        </p:cTn>
-                                        <p:tgtEl>
-                                          <p:spTgt spid="29"/>
+                                          <p:spTgt spid="7"/>
                                         </p:tgtEl>
                                         <p:attrNameLst>
                                           <p:attrName>style.visibility</p:attrName>
@@ -10429,9 +10367,9 @@
                                     </p:set>
                                     <p:animEffect transition="in" filter="fade">
                                       <p:cBhvr>
-                                        <p:cTn id="11" dur="500"/>
+                                        <p:cTn id="7" dur="500"/>
                                         <p:tgtEl>
-                                          <p:spTgt spid="29"/>
+                                          <p:spTgt spid="7"/>
                                         </p:tgtEl>
                                       </p:cBhvr>
                                     </p:animEffect>
@@ -10445,32 +10383,32 @@
                     </p:cTn>
                   </p:par>
                   <p:par>
-                    <p:cTn id="12" fill="hold">
+                    <p:cTn id="8" fill="hold">
                       <p:stCondLst>
                         <p:cond delay="indefinite"/>
                       </p:stCondLst>
                       <p:childTnLst>
                         <p:par>
-                          <p:cTn id="13" fill="hold">
+                          <p:cTn id="9" fill="hold">
                             <p:stCondLst>
                               <p:cond delay="0"/>
                             </p:stCondLst>
                             <p:childTnLst>
                               <p:par>
-                                <p:cTn id="14" presetID="10" presetClass="entr" presetSubtype="0" fill="hold" nodeType="clickEffect">
+                                <p:cTn id="10" presetID="10" presetClass="entr" presetSubtype="0" fill="hold" nodeType="clickEffect">
                                   <p:stCondLst>
                                     <p:cond delay="0"/>
                                   </p:stCondLst>
                                   <p:childTnLst>
                                     <p:set>
                                       <p:cBhvr>
-                                        <p:cTn id="15" dur="1" fill="hold">
+                                        <p:cTn id="11" dur="1" fill="hold">
                                           <p:stCondLst>
                                             <p:cond delay="0"/>
                                           </p:stCondLst>
                                         </p:cTn>
                                         <p:tgtEl>
-                                          <p:spTgt spid="32"/>
+                                          <p:spTgt spid="8"/>
                                         </p:tgtEl>
                                         <p:attrNameLst>
                                           <p:attrName>style.visibility</p:attrName>
@@ -10482,9 +10420,9 @@
                                     </p:set>
                                     <p:animEffect transition="in" filter="fade">
                                       <p:cBhvr>
-                                        <p:cTn id="16" dur="500"/>
+                                        <p:cTn id="12" dur="500"/>
                                         <p:tgtEl>
-                                          <p:spTgt spid="32"/>
+                                          <p:spTgt spid="8"/>
                                         </p:tgtEl>
                                       </p:cBhvr>
                                     </p:animEffect>
@@ -10498,32 +10436,32 @@
                     </p:cTn>
                   </p:par>
                   <p:par>
-                    <p:cTn id="17" fill="hold">
+                    <p:cTn id="13" fill="hold">
                       <p:stCondLst>
                         <p:cond delay="indefinite"/>
                       </p:stCondLst>
                       <p:childTnLst>
                         <p:par>
-                          <p:cTn id="18" fill="hold">
+                          <p:cTn id="14" fill="hold">
                             <p:stCondLst>
                               <p:cond delay="0"/>
                             </p:stCondLst>
                             <p:childTnLst>
                               <p:par>
-                                <p:cTn id="19" presetID="10" presetClass="entr" presetSubtype="0" fill="hold" nodeType="clickEffect">
+                                <p:cTn id="15" presetID="10" presetClass="entr" presetSubtype="0" fill="hold" nodeType="clickEffect">
                                   <p:stCondLst>
                                     <p:cond delay="0"/>
                                   </p:stCondLst>
                                   <p:childTnLst>
                                     <p:set>
                                       <p:cBhvr>
-                                        <p:cTn id="20" dur="1" fill="hold">
+                                        <p:cTn id="16" dur="1" fill="hold">
                                           <p:stCondLst>
                                             <p:cond delay="0"/>
                                           </p:stCondLst>
                                         </p:cTn>
                                         <p:tgtEl>
-                                          <p:spTgt spid="31"/>
+                                          <p:spTgt spid="10"/>
                                         </p:tgtEl>
                                         <p:attrNameLst>
                                           <p:attrName>style.visibility</p:attrName>
@@ -10535,9 +10473,9 @@
                                     </p:set>
                                     <p:animEffect transition="in" filter="fade">
                                       <p:cBhvr>
-                                        <p:cTn id="21" dur="500"/>
+                                        <p:cTn id="17" dur="500"/>
                                         <p:tgtEl>
-                                          <p:spTgt spid="31"/>
+                                          <p:spTgt spid="10"/>
                                         </p:tgtEl>
                                       </p:cBhvr>
                                     </p:animEffect>

</xml_diff>

<commit_message>
added backup presentation without demo, preliminary yamls for demo
</commit_message>
<xml_diff>
--- a/_defense_presentation.pptx
+++ b/_defense_presentation.pptx
@@ -224,7 +224,7 @@
           <a:p>
             <a:fld id="{BDB98AD5-63E8-406E-B0D0-3CBA27A49C51}" type="datetimeFigureOut">
               <a:rPr lang="de-DE" smtClean="0"/>
-              <a:t>12.09.2019</a:t>
+              <a:t>14.09.2019</a:t>
             </a:fld>
             <a:endParaRPr lang="de-DE"/>
           </a:p>
@@ -3998,7 +3998,21 @@
                 <a:ea typeface="+mn-ea"/>
                 <a:cs typeface="+mn-cs"/>
               </a:rPr>
-              <a:t> / 9</a:t>
+              <a:t> </a:t>
+            </a:r>
+            <a:r>
+              <a:rPr lang="de-DE" sz="1050" b="0" kern="1200" smtClean="0">
+                <a:solidFill>
+                  <a:schemeClr val="tx2">
+                    <a:lumMod val="20000"/>
+                    <a:lumOff val="80000"/>
+                  </a:schemeClr>
+                </a:solidFill>
+                <a:latin typeface="+mn-lt"/>
+                <a:ea typeface="+mn-ea"/>
+                <a:cs typeface="+mn-cs"/>
+              </a:rPr>
+              <a:t>/ 10</a:t>
             </a:r>
             <a:endParaRPr lang="de-DE" sz="1050" b="0" kern="1200" dirty="0">
               <a:solidFill>

</xml_diff>